<commit_message>
added tableau link to ppt
</commit_message>
<xml_diff>
--- a/Project 3 Presentation.pptx
+++ b/Project 3 Presentation.pptx
@@ -8266,12 +8266,18 @@
         <a:lstStyle/>
         <a:p>
           <a:r>
-            <a:rPr lang="en-US" dirty="0" err="1"/>
-            <a:t>lksjdlkjfalksjdf</a:t>
+            <a:rPr lang="en-US" dirty="0"/>
+            <a:t>Tableau Dashboard</a:t>
           </a:r>
-          <a:endParaRPr lang="en-US" dirty="0"/>
         </a:p>
       </dgm:t>
+      <dgm:extLst>
+        <a:ext uri="{E40237B7-FDA0-4F09-8148-C483321AD2D9}">
+          <dgm14:cNvPr xmlns:dgm14="http://schemas.microsoft.com/office/drawing/2010/diagram" id="0" name="">
+            <a:hlinkClick xmlns:r="http://schemas.openxmlformats.org/officeDocument/2006/relationships" r:id="rId1"/>
+          </dgm14:cNvPr>
+        </a:ext>
+      </dgm:extLst>
     </dgm:pt>
     <dgm:pt modelId="{CA7F12B1-7CD7-4261-80E9-86627EB98913}" type="parTrans" cxnId="{A987FC64-3D52-4EC1-8286-137CBCD940E3}">
       <dgm:prSet/>
@@ -8316,7 +8322,7 @@
       <dgm:spPr/>
     </dgm:pt>
     <dgm:pt modelId="{A05ED155-FC1D-47CF-BC8C-B4A18AEBFB91}" type="pres">
-      <dgm:prSet presAssocID="{1E86B86D-31E3-4675-9A0A-F872465E7244}" presName="rootText" presStyleLbl="node1" presStyleIdx="0" presStyleCnt="1" custLinFactNeighborX="-36772" custLinFactNeighborY="14225"/>
+      <dgm:prSet presAssocID="{1E86B86D-31E3-4675-9A0A-F872465E7244}" presName="rootText" presStyleLbl="node1" presStyleIdx="0" presStyleCnt="1" custLinFactNeighborX="-27294" custLinFactNeighborY="0"/>
       <dgm:spPr/>
     </dgm:pt>
     <dgm:pt modelId="{CCD261A9-C241-4E07-8058-6198F59F995E}" type="pres">
@@ -8343,7 +8349,7 @@
   <dgm:whole/>
   <dgm:extLst>
     <a:ext uri="http://schemas.microsoft.com/office/drawing/2008/diagram">
-      <dsp:dataModelExt xmlns:dsp="http://schemas.microsoft.com/office/drawing/2008/diagram" relId="rId6" minVer="http://schemas.openxmlformats.org/drawingml/2006/diagram"/>
+      <dsp:dataModelExt xmlns:dsp="http://schemas.microsoft.com/office/drawing/2008/diagram" relId="rId7" minVer="http://schemas.openxmlformats.org/drawingml/2006/diagram"/>
     </a:ext>
   </dgm:extLst>
 </dgm:dataModel>
@@ -11168,7 +11174,7 @@
       </dsp:nvSpPr>
       <dsp:spPr>
         <a:xfrm>
-          <a:off x="0" y="2941"/>
+          <a:off x="0" y="1470"/>
           <a:ext cx="4555956" cy="2277978"/>
         </a:xfrm>
         <a:prstGeom prst="roundRect">
@@ -11212,12 +11218,12 @@
         </a:fontRef>
       </dsp:style>
       <dsp:txBody>
-        <a:bodyPr spcFirstLastPara="0" vert="horz" wrap="square" lIns="106680" tIns="71120" rIns="106680" bIns="71120" numCol="1" spcCol="1270" anchor="ctr" anchorCtr="0">
+        <a:bodyPr spcFirstLastPara="0" vert="horz" wrap="square" lIns="123825" tIns="82550" rIns="123825" bIns="82550" numCol="1" spcCol="1270" anchor="ctr" anchorCtr="0">
           <a:noAutofit/>
         </a:bodyPr>
         <a:lstStyle/>
         <a:p>
-          <a:pPr marL="0" lvl="0" indent="0" algn="ctr" defTabSz="2489200">
+          <a:pPr marL="0" lvl="0" indent="0" algn="ctr" defTabSz="2889250">
             <a:lnSpc>
               <a:spcPct val="90000"/>
             </a:lnSpc>
@@ -11230,14 +11236,13 @@
             <a:buNone/>
           </a:pPr>
           <a:r>
-            <a:rPr lang="en-US" sz="5600" kern="1200" dirty="0" err="1"/>
-            <a:t>lksjdlkjfalksjdf</a:t>
+            <a:rPr lang="en-US" sz="6500" kern="1200" dirty="0"/>
+            <a:t>Tableau Dashboard</a:t>
           </a:r>
-          <a:endParaRPr lang="en-US" sz="5600" kern="1200" dirty="0"/>
         </a:p>
       </dsp:txBody>
       <dsp:txXfrm>
-        <a:off x="66720" y="69661"/>
+        <a:off x="66720" y="68190"/>
         <a:ext cx="4422516" cy="2144538"/>
       </dsp:txXfrm>
     </dsp:sp>
@@ -24481,7 +24486,7 @@
           <a:p>
             <a:fld id="{E19AF454-D955-4480-8312-DFA00BD0DEAE}" type="datetimeFigureOut">
               <a:rPr lang="en-US" smtClean="0"/>
-              <a:t>6/29/2019</a:t>
+              <a:t>7/1/2019</a:t>
             </a:fld>
             <a:endParaRPr lang="en-US"/>
           </a:p>
@@ -24852,6 +24857,93 @@
 </p:notes>
 </file>
 
+<file path=ppt/notesSlides/notesSlide2.xml><?xml version="1.0" encoding="utf-8"?>
+<p:notes xmlns:a="http://schemas.openxmlformats.org/drawingml/2006/main" xmlns:r="http://schemas.openxmlformats.org/officeDocument/2006/relationships" xmlns:p="http://schemas.openxmlformats.org/presentationml/2006/main">
+  <p:cSld>
+    <p:spTree>
+      <p:nvGrpSpPr>
+        <p:cNvPr id="1" name=""/>
+        <p:cNvGrpSpPr/>
+        <p:nvPr/>
+      </p:nvGrpSpPr>
+      <p:grpSpPr>
+        <a:xfrm>
+          <a:off x="0" y="0"/>
+          <a:ext cx="0" cy="0"/>
+          <a:chOff x="0" y="0"/>
+          <a:chExt cx="0" cy="0"/>
+        </a:xfrm>
+      </p:grpSpPr>
+      <p:sp>
+        <p:nvSpPr>
+          <p:cNvPr id="2" name="Slide Image Placeholder 1"/>
+          <p:cNvSpPr>
+            <a:spLocks noGrp="1" noRot="1" noChangeAspect="1"/>
+          </p:cNvSpPr>
+          <p:nvPr>
+            <p:ph type="sldImg"/>
+          </p:nvPr>
+        </p:nvSpPr>
+        <p:spPr/>
+      </p:sp>
+      <p:sp>
+        <p:nvSpPr>
+          <p:cNvPr id="3" name="Notes Placeholder 2"/>
+          <p:cNvSpPr>
+            <a:spLocks noGrp="1"/>
+          </p:cNvSpPr>
+          <p:nvPr>
+            <p:ph type="body" idx="1"/>
+          </p:nvPr>
+        </p:nvSpPr>
+        <p:spPr/>
+        <p:txBody>
+          <a:bodyPr/>
+          <a:lstStyle/>
+          <a:p>
+            <a:r>
+              <a:rPr lang="en-US" dirty="0"/>
+              <a:t>Box is linked to dashboard</a:t>
+            </a:r>
+          </a:p>
+        </p:txBody>
+      </p:sp>
+      <p:sp>
+        <p:nvSpPr>
+          <p:cNvPr id="4" name="Slide Number Placeholder 3"/>
+          <p:cNvSpPr>
+            <a:spLocks noGrp="1"/>
+          </p:cNvSpPr>
+          <p:nvPr>
+            <p:ph type="sldNum" sz="quarter" idx="5"/>
+          </p:nvPr>
+        </p:nvSpPr>
+        <p:spPr/>
+        <p:txBody>
+          <a:bodyPr/>
+          <a:lstStyle/>
+          <a:p>
+            <a:fld id="{E3002187-5DFB-43D8-95DE-207C84D4D3F8}" type="slidenum">
+              <a:rPr lang="en-US" smtClean="0"/>
+              <a:t>9</a:t>
+            </a:fld>
+            <a:endParaRPr lang="en-US"/>
+          </a:p>
+        </p:txBody>
+      </p:sp>
+    </p:spTree>
+    <p:extLst>
+      <p:ext uri="{BB962C8B-B14F-4D97-AF65-F5344CB8AC3E}">
+        <p14:creationId xmlns:p14="http://schemas.microsoft.com/office/powerpoint/2010/main" val="2918302228"/>
+      </p:ext>
+    </p:extLst>
+  </p:cSld>
+  <p:clrMapOvr>
+    <a:masterClrMapping/>
+  </p:clrMapOvr>
+</p:notes>
+</file>
+
 <file path=ppt/slideLayouts/slideLayout1.xml><?xml version="1.0" encoding="utf-8"?>
 <p:sldLayout xmlns:a="http://schemas.openxmlformats.org/drawingml/2006/main" xmlns:r="http://schemas.openxmlformats.org/officeDocument/2006/relationships" xmlns:p="http://schemas.openxmlformats.org/presentationml/2006/main" type="title" preserve="1">
   <p:cSld name="Title Slide">
@@ -25048,7 +25140,7 @@
           <a:p>
             <a:fld id="{FD75B5A3-0CF0-400F-918C-652ACE9597E2}" type="datetimeFigureOut">
               <a:rPr lang="en-US" smtClean="0"/>
-              <a:t>6/29/2019</a:t>
+              <a:t>7/1/2019</a:t>
             </a:fld>
             <a:endParaRPr lang="en-US"/>
           </a:p>
@@ -25269,7 +25361,7 @@
           <a:p>
             <a:fld id="{FD75B5A3-0CF0-400F-918C-652ACE9597E2}" type="datetimeFigureOut">
               <a:rPr lang="en-US" smtClean="0"/>
-              <a:t>6/29/2019</a:t>
+              <a:t>7/1/2019</a:t>
             </a:fld>
             <a:endParaRPr lang="en-US"/>
           </a:p>
@@ -25449,7 +25541,7 @@
           <a:p>
             <a:fld id="{FD75B5A3-0CF0-400F-918C-652ACE9597E2}" type="datetimeFigureOut">
               <a:rPr lang="en-US" smtClean="0"/>
-              <a:t>6/29/2019</a:t>
+              <a:t>7/1/2019</a:t>
             </a:fld>
             <a:endParaRPr lang="en-US"/>
           </a:p>
@@ -25619,7 +25711,7 @@
           <a:p>
             <a:fld id="{FD75B5A3-0CF0-400F-918C-652ACE9597E2}" type="datetimeFigureOut">
               <a:rPr lang="en-US" smtClean="0"/>
-              <a:t>6/29/2019</a:t>
+              <a:t>7/1/2019</a:t>
             </a:fld>
             <a:endParaRPr lang="en-US"/>
           </a:p>
@@ -25870,7 +25962,7 @@
           <a:p>
             <a:fld id="{FD75B5A3-0CF0-400F-918C-652ACE9597E2}" type="datetimeFigureOut">
               <a:rPr lang="en-US" smtClean="0"/>
-              <a:t>6/29/2019</a:t>
+              <a:t>7/1/2019</a:t>
             </a:fld>
             <a:endParaRPr lang="en-US"/>
           </a:p>
@@ -26193,7 +26285,7 @@
           <a:p>
             <a:fld id="{FD75B5A3-0CF0-400F-918C-652ACE9597E2}" type="datetimeFigureOut">
               <a:rPr lang="en-US" smtClean="0"/>
-              <a:t>6/29/2019</a:t>
+              <a:t>7/1/2019</a:t>
             </a:fld>
             <a:endParaRPr lang="en-US"/>
           </a:p>
@@ -26617,7 +26709,7 @@
           <a:p>
             <a:fld id="{FD75B5A3-0CF0-400F-918C-652ACE9597E2}" type="datetimeFigureOut">
               <a:rPr lang="en-US" smtClean="0"/>
-              <a:t>6/29/2019</a:t>
+              <a:t>7/1/2019</a:t>
             </a:fld>
             <a:endParaRPr lang="en-US"/>
           </a:p>
@@ -26735,7 +26827,7 @@
           <a:p>
             <a:fld id="{FD75B5A3-0CF0-400F-918C-652ACE9597E2}" type="datetimeFigureOut">
               <a:rPr lang="en-US" smtClean="0"/>
-              <a:t>6/29/2019</a:t>
+              <a:t>7/1/2019</a:t>
             </a:fld>
             <a:endParaRPr lang="en-US"/>
           </a:p>
@@ -26830,7 +26922,7 @@
           <a:p>
             <a:fld id="{FD75B5A3-0CF0-400F-918C-652ACE9597E2}" type="datetimeFigureOut">
               <a:rPr lang="en-US" smtClean="0"/>
-              <a:t>6/29/2019</a:t>
+              <a:t>7/1/2019</a:t>
             </a:fld>
             <a:endParaRPr lang="en-US"/>
           </a:p>
@@ -27120,7 +27212,7 @@
           <a:p>
             <a:fld id="{FD75B5A3-0CF0-400F-918C-652ACE9597E2}" type="datetimeFigureOut">
               <a:rPr lang="en-US" smtClean="0"/>
-              <a:t>6/29/2019</a:t>
+              <a:t>7/1/2019</a:t>
             </a:fld>
             <a:endParaRPr lang="en-US"/>
           </a:p>
@@ -27392,7 +27484,7 @@
           <a:p>
             <a:fld id="{FD75B5A3-0CF0-400F-918C-652ACE9597E2}" type="datetimeFigureOut">
               <a:rPr lang="en-US" smtClean="0"/>
-              <a:t>6/29/2019</a:t>
+              <a:t>7/1/2019</a:t>
             </a:fld>
             <a:endParaRPr lang="en-US"/>
           </a:p>
@@ -27646,7 +27738,7 @@
           <a:p>
             <a:fld id="{FD75B5A3-0CF0-400F-918C-652ACE9597E2}" type="datetimeFigureOut">
               <a:rPr lang="en-US" smtClean="0"/>
-              <a:t>6/29/2019</a:t>
+              <a:t>7/1/2019</a:t>
             </a:fld>
             <a:endParaRPr lang="en-US"/>
           </a:p>
@@ -29189,41 +29281,6 @@
           <a:chExt cx="0" cy="0"/>
         </a:xfrm>
       </p:grpSpPr>
-      <p:sp>
-        <p:nvSpPr>
-          <p:cNvPr id="2" name="Title 1">
-            <a:extLst>
-              <a:ext uri="{FF2B5EF4-FFF2-40B4-BE49-F238E27FC236}">
-                <a16:creationId xmlns:a16="http://schemas.microsoft.com/office/drawing/2014/main" id="{969C615E-8D80-487E-A16C-7DF0B22547A1}"/>
-              </a:ext>
-            </a:extLst>
-          </p:cNvPr>
-          <p:cNvSpPr>
-            <a:spLocks noGrp="1"/>
-          </p:cNvSpPr>
-          <p:nvPr>
-            <p:ph type="title"/>
-          </p:nvPr>
-        </p:nvSpPr>
-        <p:spPr>
-          <a:xfrm>
-            <a:off x="1143000" y="609600"/>
-            <a:ext cx="9875520" cy="1356360"/>
-          </a:xfrm>
-        </p:spPr>
-        <p:txBody>
-          <a:bodyPr>
-            <a:normAutofit/>
-          </a:bodyPr>
-          <a:lstStyle/>
-          <a:p>
-            <a:r>
-              <a:rPr lang="en-US" dirty="0"/>
-              <a:t>Tableau</a:t>
-            </a:r>
-          </a:p>
-        </p:txBody>
-      </p:sp>
       <p:graphicFrame>
         <p:nvGraphicFramePr>
           <p:cNvPr id="4" name="Content Placeholder 3">
@@ -29240,7 +29297,7 @@
             <p:ph idx="1"/>
             <p:extLst>
               <p:ext uri="{D42A27DB-BD31-4B8C-83A1-F6EECF244321}">
-                <p14:modId xmlns:p14="http://schemas.microsoft.com/office/powerpoint/2010/main" val="3460422652"/>
+                <p14:modId xmlns:p14="http://schemas.microsoft.com/office/powerpoint/2010/main" val="4162638207"/>
               </p:ext>
             </p:extLst>
           </p:nvPr>
@@ -29251,7 +29308,7 @@
         </p:xfrm>
         <a:graphic>
           <a:graphicData uri="http://schemas.openxmlformats.org/drawingml/2006/diagram">
-            <dgm:relIds xmlns:dgm="http://schemas.openxmlformats.org/drawingml/2006/diagram" xmlns:r="http://schemas.openxmlformats.org/officeDocument/2006/relationships" r:dm="rId2" r:lo="rId3" r:qs="rId4" r:cs="rId5"/>
+            <dgm:relIds xmlns:dgm="http://schemas.openxmlformats.org/drawingml/2006/diagram" xmlns:r="http://schemas.openxmlformats.org/officeDocument/2006/relationships" r:dm="rId3" r:lo="rId4" r:qs="rId5" r:cs="rId6"/>
           </a:graphicData>
         </a:graphic>
       </p:graphicFrame>
@@ -29270,13 +29327,13 @@
           <p:nvPr/>
         </p:nvPicPr>
         <p:blipFill>
-          <a:blip r:embed="rId7">
+          <a:blip r:embed="rId8">
             <a:extLst>
               <a:ext uri="{28A0092B-C50C-407E-A947-70E740481C1C}">
                 <a14:useLocalDpi xmlns:a14="http://schemas.microsoft.com/office/drawing/2010/main" val="0"/>
               </a:ext>
               <a:ext uri="{96DAC541-7B7A-43D3-8B79-37D633B846F1}">
-                <asvg:svgBlip xmlns:asvg="http://schemas.microsoft.com/office/drawing/2016/SVG/main" r:embed="rId8"/>
+                <asvg:svgBlip xmlns:asvg="http://schemas.microsoft.com/office/drawing/2016/SVG/main" r:embed="rId9"/>
               </a:ext>
             </a:extLst>
           </a:blip>
@@ -29286,7 +29343,7 @@
         </p:blipFill>
         <p:spPr>
           <a:xfrm rot="18633322">
-            <a:off x="2867519" y="3941840"/>
+            <a:off x="2813090" y="4072468"/>
             <a:ext cx="2154934" cy="2154934"/>
           </a:xfrm>
           <a:prstGeom prst="rect">
@@ -29294,6 +29351,101 @@
           </a:prstGeom>
         </p:spPr>
       </p:pic>
+      <p:sp>
+        <p:nvSpPr>
+          <p:cNvPr id="6" name="Rectangle 5">
+            <a:extLst>
+              <a:ext uri="{FF2B5EF4-FFF2-40B4-BE49-F238E27FC236}">
+                <a16:creationId xmlns:a16="http://schemas.microsoft.com/office/drawing/2014/main" id="{967BA9B0-534E-4A8C-9C41-AC7B5990A58F}"/>
+              </a:ext>
+            </a:extLst>
+          </p:cNvPr>
+          <p:cNvSpPr/>
+          <p:nvPr/>
+        </p:nvSpPr>
+        <p:spPr>
+          <a:xfrm rot="18675630">
+            <a:off x="2036471" y="6219438"/>
+            <a:ext cx="1613352" cy="655367"/>
+          </a:xfrm>
+          <a:prstGeom prst="rect">
+            <a:avLst/>
+          </a:prstGeom>
+        </p:spPr>
+        <p:style>
+          <a:lnRef idx="2">
+            <a:schemeClr val="accent1">
+              <a:shade val="50000"/>
+            </a:schemeClr>
+          </a:lnRef>
+          <a:fillRef idx="1">
+            <a:schemeClr val="accent1"/>
+          </a:fillRef>
+          <a:effectRef idx="0">
+            <a:schemeClr val="accent1"/>
+          </a:effectRef>
+          <a:fontRef idx="minor">
+            <a:schemeClr val="lt1"/>
+          </a:fontRef>
+        </p:style>
+        <p:txBody>
+          <a:bodyPr rtlCol="0" anchor="ctr"/>
+          <a:lstStyle/>
+          <a:p>
+            <a:pPr algn="ctr"/>
+            <a:endParaRPr lang="en-US"/>
+          </a:p>
+        </p:txBody>
+      </p:sp>
+      <p:sp>
+        <p:nvSpPr>
+          <p:cNvPr id="8" name="Rectangle 7">
+            <a:extLst>
+              <a:ext uri="{FF2B5EF4-FFF2-40B4-BE49-F238E27FC236}">
+                <a16:creationId xmlns:a16="http://schemas.microsoft.com/office/drawing/2014/main" id="{4D449AA7-0512-47C4-9D72-6594CC4DF0A9}"/>
+              </a:ext>
+            </a:extLst>
+          </p:cNvPr>
+          <p:cNvSpPr/>
+          <p:nvPr/>
+        </p:nvSpPr>
+        <p:spPr>
+          <a:xfrm rot="2524904">
+            <a:off x="3084044" y="5806999"/>
+            <a:ext cx="662682" cy="187935"/>
+          </a:xfrm>
+          <a:prstGeom prst="rect">
+            <a:avLst/>
+          </a:prstGeom>
+          <a:solidFill>
+            <a:schemeClr val="bg1"/>
+          </a:solidFill>
+        </p:spPr>
+        <p:style>
+          <a:lnRef idx="2">
+            <a:schemeClr val="accent1">
+              <a:shade val="50000"/>
+            </a:schemeClr>
+          </a:lnRef>
+          <a:fillRef idx="1">
+            <a:schemeClr val="accent1"/>
+          </a:fillRef>
+          <a:effectRef idx="0">
+            <a:schemeClr val="accent1"/>
+          </a:effectRef>
+          <a:fontRef idx="minor">
+            <a:schemeClr val="lt1"/>
+          </a:fontRef>
+        </p:style>
+        <p:txBody>
+          <a:bodyPr rtlCol="0" anchor="ctr"/>
+          <a:lstStyle/>
+          <a:p>
+            <a:pPr algn="ctr"/>
+            <a:endParaRPr lang="en-US"/>
+          </a:p>
+        </p:txBody>
+      </p:sp>
     </p:spTree>
     <p:extLst>
       <p:ext uri="{BB962C8B-B14F-4D97-AF65-F5344CB8AC3E}">

</xml_diff>

<commit_message>
tiny changes to pp
</commit_message>
<xml_diff>
--- a/Project 3 Presentation.pptx
+++ b/Project 3 Presentation.pptx
@@ -6118,7 +6118,7 @@
 <dgm:dataModel xmlns:dgm="http://schemas.openxmlformats.org/drawingml/2006/diagram" xmlns:a="http://schemas.openxmlformats.org/drawingml/2006/main">
   <dgm:ptLst>
     <dgm:pt modelId="{AE96AD04-4614-4966-9B26-324ABD01D968}" type="doc">
-      <dgm:prSet loTypeId="urn:microsoft.com/office/officeart/2005/8/layout/vList2" loCatId="list" qsTypeId="urn:microsoft.com/office/officeart/2005/8/quickstyle/simple1" qsCatId="simple" csTypeId="urn:microsoft.com/office/officeart/2005/8/colors/colorful2" csCatId="colorful"/>
+      <dgm:prSet loTypeId="urn:microsoft.com/office/officeart/2005/8/layout/vList2" loCatId="list" qsTypeId="urn:microsoft.com/office/officeart/2005/8/quickstyle/simple1" qsCatId="simple" csTypeId="urn:microsoft.com/office/officeart/2005/8/colors/colorful2" csCatId="colorful" phldr="1"/>
       <dgm:spPr/>
       <dgm:t>
         <a:bodyPr/>
@@ -6172,12 +6172,8 @@
         <a:lstStyle/>
         <a:p>
           <a:r>
-            <a:rPr lang="en-US" dirty="0" err="1"/>
-            <a:t>Leanding</a:t>
-          </a:r>
-          <a:r>
             <a:rPr lang="en-US" dirty="0"/>
-            <a:t> Club Loan Statistics</a:t>
+            <a:t>Lending Club Loan Statistics</a:t>
           </a:r>
         </a:p>
       </dgm:t>
@@ -6484,11 +6480,11 @@
   <dgm:cxnLst>
     <dgm:cxn modelId="{EC359532-8AF6-4718-941D-40E69825CAE7}" type="presOf" srcId="{4421DF15-B8C0-4B50-82B6-B9EED132747B}" destId="{311AB7A1-1776-4EDE-BC3F-5E4F7257A62C}" srcOrd="0" destOrd="1" presId="urn:microsoft.com/office/officeart/2005/8/layout/vList2"/>
     <dgm:cxn modelId="{05A2A43C-3E63-4560-A50A-1278765C31E3}" type="presOf" srcId="{F490BCC9-A961-4398-A0B8-2F4CE98B72A5}" destId="{F57CD214-0BE7-4D31-AB81-2450EE2341B3}" srcOrd="0" destOrd="0" presId="urn:microsoft.com/office/officeart/2005/8/layout/vList2"/>
-    <dgm:cxn modelId="{2552D45C-49E5-4B5B-AC34-3A092425962D}" srcId="{4C61AE09-7FD2-4CBF-BB2C-76893FAC7E3F}" destId="{BB6E6724-2B44-47D2-AF72-4B25A824FCB5}" srcOrd="0" destOrd="0" parTransId="{0BD34D78-811B-4E90-AFB6-7226BA10E583}" sibTransId="{A612F9F9-87B9-40E5-AA97-B79B33DFD90C}"/>
     <dgm:cxn modelId="{326F0E45-D5C8-4AD9-A393-2A0E3C3FF812}" type="presOf" srcId="{4C61AE09-7FD2-4CBF-BB2C-76893FAC7E3F}" destId="{40311292-6713-44B1-9A00-D1DBBE3CA2B5}" srcOrd="0" destOrd="0" presId="urn:microsoft.com/office/officeart/2005/8/layout/vList2"/>
-    <dgm:cxn modelId="{AAB5BC6F-1098-4607-89CA-F7192F2E6F69}" type="presOf" srcId="{12878C2E-FC51-4557-ACE1-A542E4FD3D1B}" destId="{C91D677E-D6C6-4A76-9907-50239BE03FBB}" srcOrd="0" destOrd="0" presId="urn:microsoft.com/office/officeart/2005/8/layout/vList2"/>
     <dgm:cxn modelId="{2CD5DD50-D04A-4372-A4AA-46A5CBEC0064}" type="presOf" srcId="{A4713EAC-B66E-42B7-B3B5-1C30E6D68BCA}" destId="{5EE54C2D-D42D-4773-B9A4-027A45EE453B}" srcOrd="0" destOrd="0" presId="urn:microsoft.com/office/officeart/2005/8/layout/vList2"/>
     <dgm:cxn modelId="{990CC458-4C36-4341-B02E-AA0EE0AEC75F}" type="presOf" srcId="{BB6E6724-2B44-47D2-AF72-4B25A824FCB5}" destId="{311AB7A1-1776-4EDE-BC3F-5E4F7257A62C}" srcOrd="0" destOrd="0" presId="urn:microsoft.com/office/officeart/2005/8/layout/vList2"/>
+    <dgm:cxn modelId="{2552D45C-49E5-4B5B-AC34-3A092425962D}" srcId="{4C61AE09-7FD2-4CBF-BB2C-76893FAC7E3F}" destId="{BB6E6724-2B44-47D2-AF72-4B25A824FCB5}" srcOrd="0" destOrd="0" parTransId="{0BD34D78-811B-4E90-AFB6-7226BA10E583}" sibTransId="{A612F9F9-87B9-40E5-AA97-B79B33DFD90C}"/>
+    <dgm:cxn modelId="{AAB5BC6F-1098-4607-89CA-F7192F2E6F69}" type="presOf" srcId="{12878C2E-FC51-4557-ACE1-A542E4FD3D1B}" destId="{C91D677E-D6C6-4A76-9907-50239BE03FBB}" srcOrd="0" destOrd="0" presId="urn:microsoft.com/office/officeart/2005/8/layout/vList2"/>
     <dgm:cxn modelId="{3AACF484-5DAB-4E9E-8116-44754E4CA9F3}" type="presOf" srcId="{7246AEBE-DB6E-44E1-BAC8-9930CA960C04}" destId="{2C677022-93DA-46D8-9B45-93BDAE0A5189}" srcOrd="0" destOrd="0" presId="urn:microsoft.com/office/officeart/2005/8/layout/vList2"/>
     <dgm:cxn modelId="{8F58FF85-65EC-4154-BE79-7918355D0A5D}" type="presOf" srcId="{AE96AD04-4614-4966-9B26-324ABD01D968}" destId="{DB9FFB6B-51BE-4D26-BAC5-A21457E16A24}" srcOrd="0" destOrd="0" presId="urn:microsoft.com/office/officeart/2005/8/layout/vList2"/>
     <dgm:cxn modelId="{FDFA2A87-F92A-40E4-8831-7A5039378C29}" srcId="{AE96AD04-4614-4966-9B26-324ABD01D968}" destId="{4C61AE09-7FD2-4CBF-BB2C-76893FAC7E3F}" srcOrd="2" destOrd="0" parTransId="{4F47D517-8946-4C5D-B5D3-1223AEDB52E3}" sibTransId="{2C43CCA1-5F0A-4159-B559-E43268159D03}"/>
@@ -6735,9 +6731,9 @@
   </dgm:ptLst>
   <dgm:cxnLst>
     <dgm:cxn modelId="{1B44C82F-64AB-4D0E-BF06-7DFB15F04CB7}" type="presOf" srcId="{08FB285F-8F3A-405A-B2CE-019CA0A1FF9D}" destId="{D6C4B542-2A49-47E5-9129-46417D2958B1}" srcOrd="0" destOrd="0" presId="urn:microsoft.com/office/officeart/2005/8/layout/default"/>
+    <dgm:cxn modelId="{EB639155-AE7C-43F7-8D75-7A5C35B6DF32}" type="presOf" srcId="{A7EEF244-7C65-4D08-BB46-1365B3F8BD99}" destId="{C474E228-7782-4155-82DB-002656ADA414}" srcOrd="0" destOrd="0" presId="urn:microsoft.com/office/officeart/2005/8/layout/default"/>
     <dgm:cxn modelId="{C18C7868-D947-4CAA-B136-937E9D04F6D9}" srcId="{3B10C95A-4376-4873-A5C9-6ED8C8EBBBB7}" destId="{08FB285F-8F3A-405A-B2CE-019CA0A1FF9D}" srcOrd="3" destOrd="0" parTransId="{ADDF3CC0-DDCE-471C-8373-A45EF063923B}" sibTransId="{95A2E39B-6BC2-4FCD-9A3F-4737D9146885}"/>
     <dgm:cxn modelId="{5E78C670-9FED-4B31-B63B-CECA9053B5AB}" srcId="{3B10C95A-4376-4873-A5C9-6ED8C8EBBBB7}" destId="{51133218-984C-4653-9FC2-D3B65CC87287}" srcOrd="1" destOrd="0" parTransId="{8E6E511F-195E-4E79-875D-C59A347C0F21}" sibTransId="{85FB1143-E383-4182-8133-89CBEDEEABC0}"/>
-    <dgm:cxn modelId="{EB639155-AE7C-43F7-8D75-7A5C35B6DF32}" type="presOf" srcId="{A7EEF244-7C65-4D08-BB46-1365B3F8BD99}" destId="{C474E228-7782-4155-82DB-002656ADA414}" srcOrd="0" destOrd="0" presId="urn:microsoft.com/office/officeart/2005/8/layout/default"/>
     <dgm:cxn modelId="{A0844076-7740-4883-98B4-9D7C02FA3F63}" type="presOf" srcId="{51133218-984C-4653-9FC2-D3B65CC87287}" destId="{31F795FD-E693-4F05-8C07-DAD0B4EC33EA}" srcOrd="0" destOrd="0" presId="urn:microsoft.com/office/officeart/2005/8/layout/default"/>
     <dgm:cxn modelId="{668167AD-08C0-4DB6-9055-AF29203827BB}" srcId="{3B10C95A-4376-4873-A5C9-6ED8C8EBBBB7}" destId="{AED23E8F-851A-4E5A-A2B9-D48DFB917AA9}" srcOrd="0" destOrd="0" parTransId="{6D66A3B6-CFCD-488F-B59B-D27FA3BB2BB0}" sibTransId="{9E9808D5-5968-479C-8617-B98FD3F7791D}"/>
     <dgm:cxn modelId="{5972F1BD-C8A6-4C01-B84D-FB4A066226DF}" srcId="{3B10C95A-4376-4873-A5C9-6ED8C8EBBBB7}" destId="{A7EEF244-7C65-4D08-BB46-1365B3F8BD99}" srcOrd="2" destOrd="0" parTransId="{9FB5E909-3F9B-4302-85ED-4EB1F663D472}" sibTransId="{C65C2E1C-9F95-45D4-B24A-F918B38572FC}"/>
@@ -7104,10 +7100,10 @@
     <dgm:cxn modelId="{4C878709-0D4E-44B7-9F22-51CC113ABB75}" type="presOf" srcId="{E09FA127-42C3-4839-BC5D-31B7F3B73419}" destId="{F957663A-BB2D-42B4-ADAF-B57354805B24}" srcOrd="0" destOrd="2" presId="urn:microsoft.com/office/officeart/2005/8/layout/list1"/>
     <dgm:cxn modelId="{3ABB4231-4588-4EDB-B0EE-D8AA688E2E7B}" srcId="{168E32C5-6C2F-487E-8705-D9018A6651F1}" destId="{FAF5F005-385E-4870-9081-07678CAF1A26}" srcOrd="1" destOrd="0" parTransId="{24BC611B-AD44-4BA3-B1E0-60DF17CCD27B}" sibTransId="{63AF72EC-A127-4B8B-B575-6FAC09329FBC}"/>
     <dgm:cxn modelId="{C92AF13A-82B3-42C0-BE2F-A96977F41B82}" type="presOf" srcId="{FA9ECB3C-B23E-4048-A0C4-5954AF7912C0}" destId="{A3EC86B7-D48A-4F53-BAE9-625704ABD937}" srcOrd="1" destOrd="0" presId="urn:microsoft.com/office/officeart/2005/8/layout/list1"/>
-    <dgm:cxn modelId="{F62DA55B-844F-4CFD-8936-AEC5AC2EDB26}" type="presOf" srcId="{168E32C5-6C2F-487E-8705-D9018A6651F1}" destId="{415E5BF5-BF7F-4AB9-9181-EE520374FE5A}" srcOrd="1" destOrd="0" presId="urn:microsoft.com/office/officeart/2005/8/layout/list1"/>
     <dgm:cxn modelId="{7B2BC941-5CF1-47C4-BB1D-6AA068972C11}" srcId="{168E32C5-6C2F-487E-8705-D9018A6651F1}" destId="{A7A516E2-3697-4238-A3F3-558A2944EE49}" srcOrd="0" destOrd="0" parTransId="{1EF493AD-C408-4D0C-A5BC-D104A7AAA043}" sibTransId="{87E502C2-0163-4D0C-AF5F-E0D5717A2192}"/>
     <dgm:cxn modelId="{D479BB43-7959-4369-8A18-C94878A6D602}" srcId="{FA9ECB3C-B23E-4048-A0C4-5954AF7912C0}" destId="{D2612E15-7757-4F84-8CCE-64E9F324507B}" srcOrd="1" destOrd="0" parTransId="{7E291699-7091-4138-B906-93FC95667628}" sibTransId="{3B77FCE2-B32E-4EA4-B38C-A14E3FACEF9A}"/>
     <dgm:cxn modelId="{F714E44F-1EA6-4A1B-B20D-E9A21D0CDD41}" srcId="{FA9ECB3C-B23E-4048-A0C4-5954AF7912C0}" destId="{E09FA127-42C3-4839-BC5D-31B7F3B73419}" srcOrd="2" destOrd="0" parTransId="{3D0C8944-C59B-495C-AE81-698161700AD5}" sibTransId="{197A30F8-E22B-4C6A-8FD6-9163A2AB8CF3}"/>
+    <dgm:cxn modelId="{F62DA55B-844F-4CFD-8936-AEC5AC2EDB26}" type="presOf" srcId="{168E32C5-6C2F-487E-8705-D9018A6651F1}" destId="{415E5BF5-BF7F-4AB9-9181-EE520374FE5A}" srcOrd="1" destOrd="0" presId="urn:microsoft.com/office/officeart/2005/8/layout/list1"/>
     <dgm:cxn modelId="{2EBE2071-73F5-4956-84CE-3C7B8319E140}" type="presOf" srcId="{FA9ECB3C-B23E-4048-A0C4-5954AF7912C0}" destId="{E10CB4D0-8E5F-4299-AB0C-244D7411BE8D}" srcOrd="0" destOrd="0" presId="urn:microsoft.com/office/officeart/2005/8/layout/list1"/>
     <dgm:cxn modelId="{6D154285-09C8-4134-9AA3-4868EB645212}" type="presOf" srcId="{168E32C5-6C2F-487E-8705-D9018A6651F1}" destId="{E58BF804-BCEF-43D8-A682-C7F0F92F4E28}" srcOrd="0" destOrd="0" presId="urn:microsoft.com/office/officeart/2005/8/layout/list1"/>
     <dgm:cxn modelId="{706BC78F-26D9-4B84-8DD3-E4E3D089A638}" type="presOf" srcId="{63B1719D-1603-4062-ABCA-375EE2E37D6D}" destId="{FB1B2D74-C156-4257-B155-D79B9741B99A}" srcOrd="0" destOrd="0" presId="urn:microsoft.com/office/officeart/2005/8/layout/list1"/>
@@ -7560,10 +7556,10 @@
   <dgm:cxnLst>
     <dgm:cxn modelId="{D525A529-D658-48BC-BE5C-9D7FBD041AB9}" type="presOf" srcId="{E39DE25A-E038-4D70-BDCA-37FDBFC7BC36}" destId="{CBC756C1-C4CC-4BD9-9D0B-8A094B9C3478}" srcOrd="0" destOrd="0" presId="urn:microsoft.com/office/officeart/2018/2/layout/IconVerticalSolidList"/>
     <dgm:cxn modelId="{E5E6A739-36BF-460C-92D7-771CA33B9B88}" type="presOf" srcId="{C30545FB-C311-4A71-82D1-90763EFB75D0}" destId="{7D14BE10-2AAA-460E-A085-601589515799}" srcOrd="0" destOrd="0" presId="urn:microsoft.com/office/officeart/2018/2/layout/IconVerticalSolidList"/>
-    <dgm:cxn modelId="{B718145B-14E8-4376-8AFB-1B746ABAF1F6}" srcId="{1140417D-55B5-47A9-B631-2BCB65445BDA}" destId="{E39DE25A-E038-4D70-BDCA-37FDBFC7BC36}" srcOrd="2" destOrd="0" parTransId="{C8B7BBC4-E81A-4913-A5CA-39958C25EE98}" sibTransId="{42B4A83A-D28C-49E7-AE02-40D08F4FDB84}"/>
     <dgm:cxn modelId="{2E436B42-DEF2-4124-BB5C-A5128CEBB085}" srcId="{1140417D-55B5-47A9-B631-2BCB65445BDA}" destId="{6939EF4D-4052-4B7A-A52D-5AB7B1DA0B8F}" srcOrd="1" destOrd="0" parTransId="{184100C3-F064-4E18-A16D-816E4D6DA01F}" sibTransId="{38E4A007-BDF5-45DD-8361-3401D4B8F9AE}"/>
     <dgm:cxn modelId="{FC25A84A-CEE1-4206-91D3-12601EA9986B}" type="presOf" srcId="{A6DA349F-EBB1-4BF1-AC02-A8EF1C5A5889}" destId="{7E5DECDA-2E1C-4982-89B7-75005AE4D82D}" srcOrd="0" destOrd="0" presId="urn:microsoft.com/office/officeart/2018/2/layout/IconVerticalSolidList"/>
     <dgm:cxn modelId="{501C1850-EC56-46E8-97E8-55CB327B37DF}" type="presOf" srcId="{9FA173ED-7442-4217-9731-D44CA47C1B85}" destId="{5417DC9C-F402-4D27-BABE-A273D79FA889}" srcOrd="0" destOrd="0" presId="urn:microsoft.com/office/officeart/2018/2/layout/IconVerticalSolidList"/>
+    <dgm:cxn modelId="{B718145B-14E8-4376-8AFB-1B746ABAF1F6}" srcId="{1140417D-55B5-47A9-B631-2BCB65445BDA}" destId="{E39DE25A-E038-4D70-BDCA-37FDBFC7BC36}" srcOrd="2" destOrd="0" parTransId="{C8B7BBC4-E81A-4913-A5CA-39958C25EE98}" sibTransId="{42B4A83A-D28C-49E7-AE02-40D08F4FDB84}"/>
     <dgm:cxn modelId="{10B23C94-E244-4F41-BE11-4BAC5C03B789}" type="presOf" srcId="{B5F2D8A5-68F6-446A-88CD-62BDF3A21282}" destId="{CDA996DE-1994-4350-8CA8-915C33797E91}" srcOrd="0" destOrd="0" presId="urn:microsoft.com/office/officeart/2018/2/layout/IconVerticalSolidList"/>
     <dgm:cxn modelId="{1E018D9C-C2E1-494C-8CC3-4CC4F448A1D6}" srcId="{B5F2D8A5-68F6-446A-88CD-62BDF3A21282}" destId="{9FA173ED-7442-4217-9731-D44CA47C1B85}" srcOrd="0" destOrd="0" parTransId="{04AB8BB3-2C0C-45B5-8C35-3DD7F5957830}" sibTransId="{2D5EA29C-2108-4630-BFC9-9B37FB008117}"/>
     <dgm:cxn modelId="{8F14369D-5A79-4A89-AB9E-4730970088E8}" type="presOf" srcId="{6939EF4D-4052-4B7A-A52D-5AB7B1DA0B8F}" destId="{4B6B6EC9-C4D7-4D54-BF78-DAD481809C92}" srcOrd="0" destOrd="0" presId="urn:microsoft.com/office/officeart/2018/2/layout/IconVerticalSolidList"/>
@@ -8202,9 +8198,9 @@
   <dgm:cxnLst>
     <dgm:cxn modelId="{A5DBF40A-00EF-4D13-B53E-CE355886FAA8}" type="presOf" srcId="{5A9CE4E3-A8FA-4758-B286-4B26A6729944}" destId="{FADA1015-BAB8-4084-8250-86F50FD98CA3}" srcOrd="1" destOrd="0" presId="urn:microsoft.com/office/officeart/2011/layout/CircleProcess"/>
     <dgm:cxn modelId="{037E3F16-AA02-4FCB-B46A-984178E7A93B}" type="presOf" srcId="{7767D3EB-7A93-4209-89D7-4B920ACA27D9}" destId="{E060D1A2-31B6-4A7E-8122-43E042899A58}" srcOrd="0" destOrd="0" presId="urn:microsoft.com/office/officeart/2011/layout/CircleProcess"/>
-    <dgm:cxn modelId="{2B39E363-3E23-4282-B9AD-ABBD9CB62D71}" type="presOf" srcId="{3D1558A1-C447-4DEF-91C0-F421A8430A62}" destId="{10571EDB-FA91-4F3E-95EF-545E9A129F8A}" srcOrd="0" destOrd="0" presId="urn:microsoft.com/office/officeart/2011/layout/CircleProcess"/>
     <dgm:cxn modelId="{98181247-F96E-47DF-8055-2346974F9B98}" srcId="{7767D3EB-7A93-4209-89D7-4B920ACA27D9}" destId="{B82D6DA9-A049-420A-A09B-CF31DD698664}" srcOrd="3" destOrd="0" parTransId="{184A3769-FC94-47C4-B950-538167B996E4}" sibTransId="{7BA0B550-3C6E-4CCF-B9E7-021250A3896E}"/>
     <dgm:cxn modelId="{ACC81548-6ADC-4154-A5AB-20486AF6F6C4}" type="presOf" srcId="{90B16EED-8122-4739-9CE6-24356DAD456F}" destId="{F50792DD-CCA1-4103-AC2E-CAB107AF3B65}" srcOrd="1" destOrd="0" presId="urn:microsoft.com/office/officeart/2011/layout/CircleProcess"/>
+    <dgm:cxn modelId="{2B39E363-3E23-4282-B9AD-ABBD9CB62D71}" type="presOf" srcId="{3D1558A1-C447-4DEF-91C0-F421A8430A62}" destId="{10571EDB-FA91-4F3E-95EF-545E9A129F8A}" srcOrd="0" destOrd="0" presId="urn:microsoft.com/office/officeart/2011/layout/CircleProcess"/>
     <dgm:cxn modelId="{A5A9AB75-73DE-4CFD-A4FE-D2569D1AC89C}" srcId="{7767D3EB-7A93-4209-89D7-4B920ACA27D9}" destId="{5A9CE4E3-A8FA-4758-B286-4B26A6729944}" srcOrd="2" destOrd="0" parTransId="{CB529F8B-67A4-4F96-A376-53CF1A0E85E7}" sibTransId="{EF5B15CE-36EC-4108-AFCE-A63A51D84C9C}"/>
     <dgm:cxn modelId="{DAB15B88-FE54-430E-B086-CBB75DDCBC80}" type="presOf" srcId="{90B16EED-8122-4739-9CE6-24356DAD456F}" destId="{7C8CE646-6356-4D00-9201-F976EF976C42}" srcOrd="0" destOrd="0" presId="urn:microsoft.com/office/officeart/2011/layout/CircleProcess"/>
     <dgm:cxn modelId="{C13E1795-C636-436C-B85F-7A3CD329CF4B}" type="presOf" srcId="{B82D6DA9-A049-420A-A09B-CF31DD698664}" destId="{688D11E5-0C1D-4F0E-8E8C-63FE5E7A3B37}" srcOrd="0" destOrd="0" presId="urn:microsoft.com/office/officeart/2011/layout/CircleProcess"/>
@@ -8266,9 +8262,12 @@
         <a:lstStyle/>
         <a:p>
           <a:r>
-            <a:rPr lang="en-US" dirty="0"/>
+            <a:rPr lang="en-US" dirty="0">
+              <a:hlinkClick xmlns:r="http://schemas.openxmlformats.org/officeDocument/2006/relationships" r:id="rId1"/>
+            </a:rPr>
             <a:t>Tableau Dashboard</a:t>
           </a:r>
+          <a:endParaRPr lang="en-US" dirty="0"/>
         </a:p>
       </dgm:t>
       <dgm:extLst>
@@ -8490,12 +8489,8 @@
             <a:buChar char="•"/>
           </a:pPr>
           <a:r>
-            <a:rPr lang="en-US" sz="2400" kern="1200" dirty="0" err="1"/>
-            <a:t>Leanding</a:t>
-          </a:r>
-          <a:r>
             <a:rPr lang="en-US" sz="2400" kern="1200" dirty="0"/>
-            <a:t> Club Loan Statistics</a:t>
+            <a:t>Lending Club Loan Statistics</a:t>
           </a:r>
         </a:p>
       </dsp:txBody>
@@ -11236,9 +11231,12 @@
             <a:buNone/>
           </a:pPr>
           <a:r>
-            <a:rPr lang="en-US" sz="6500" kern="1200" dirty="0"/>
+            <a:rPr lang="en-US" sz="6500" kern="1200" dirty="0">
+              <a:hlinkClick xmlns:r="http://schemas.openxmlformats.org/officeDocument/2006/relationships" r:id="rId1"/>
+            </a:rPr>
             <a:t>Tableau Dashboard</a:t>
           </a:r>
+          <a:endParaRPr lang="en-US" sz="6500" kern="1200" dirty="0"/>
         </a:p>
       </dsp:txBody>
       <dsp:txXfrm>
@@ -24486,7 +24484,7 @@
           <a:p>
             <a:fld id="{E19AF454-D955-4480-8312-DFA00BD0DEAE}" type="datetimeFigureOut">
               <a:rPr lang="en-US" smtClean="0"/>
-              <a:t>7/1/2019</a:t>
+              <a:t>7/2/19</a:t>
             </a:fld>
             <a:endParaRPr lang="en-US"/>
           </a:p>
@@ -25140,7 +25138,7 @@
           <a:p>
             <a:fld id="{FD75B5A3-0CF0-400F-918C-652ACE9597E2}" type="datetimeFigureOut">
               <a:rPr lang="en-US" smtClean="0"/>
-              <a:t>7/1/2019</a:t>
+              <a:t>7/2/19</a:t>
             </a:fld>
             <a:endParaRPr lang="en-US"/>
           </a:p>
@@ -25361,7 +25359,7 @@
           <a:p>
             <a:fld id="{FD75B5A3-0CF0-400F-918C-652ACE9597E2}" type="datetimeFigureOut">
               <a:rPr lang="en-US" smtClean="0"/>
-              <a:t>7/1/2019</a:t>
+              <a:t>7/2/19</a:t>
             </a:fld>
             <a:endParaRPr lang="en-US"/>
           </a:p>
@@ -25541,7 +25539,7 @@
           <a:p>
             <a:fld id="{FD75B5A3-0CF0-400F-918C-652ACE9597E2}" type="datetimeFigureOut">
               <a:rPr lang="en-US" smtClean="0"/>
-              <a:t>7/1/2019</a:t>
+              <a:t>7/2/19</a:t>
             </a:fld>
             <a:endParaRPr lang="en-US"/>
           </a:p>
@@ -25711,7 +25709,7 @@
           <a:p>
             <a:fld id="{FD75B5A3-0CF0-400F-918C-652ACE9597E2}" type="datetimeFigureOut">
               <a:rPr lang="en-US" smtClean="0"/>
-              <a:t>7/1/2019</a:t>
+              <a:t>7/2/19</a:t>
             </a:fld>
             <a:endParaRPr lang="en-US"/>
           </a:p>
@@ -25962,7 +25960,7 @@
           <a:p>
             <a:fld id="{FD75B5A3-0CF0-400F-918C-652ACE9597E2}" type="datetimeFigureOut">
               <a:rPr lang="en-US" smtClean="0"/>
-              <a:t>7/1/2019</a:t>
+              <a:t>7/2/19</a:t>
             </a:fld>
             <a:endParaRPr lang="en-US"/>
           </a:p>
@@ -26285,7 +26283,7 @@
           <a:p>
             <a:fld id="{FD75B5A3-0CF0-400F-918C-652ACE9597E2}" type="datetimeFigureOut">
               <a:rPr lang="en-US" smtClean="0"/>
-              <a:t>7/1/2019</a:t>
+              <a:t>7/2/19</a:t>
             </a:fld>
             <a:endParaRPr lang="en-US"/>
           </a:p>
@@ -26709,7 +26707,7 @@
           <a:p>
             <a:fld id="{FD75B5A3-0CF0-400F-918C-652ACE9597E2}" type="datetimeFigureOut">
               <a:rPr lang="en-US" smtClean="0"/>
-              <a:t>7/1/2019</a:t>
+              <a:t>7/2/19</a:t>
             </a:fld>
             <a:endParaRPr lang="en-US"/>
           </a:p>
@@ -26827,7 +26825,7 @@
           <a:p>
             <a:fld id="{FD75B5A3-0CF0-400F-918C-652ACE9597E2}" type="datetimeFigureOut">
               <a:rPr lang="en-US" smtClean="0"/>
-              <a:t>7/1/2019</a:t>
+              <a:t>7/2/19</a:t>
             </a:fld>
             <a:endParaRPr lang="en-US"/>
           </a:p>
@@ -26922,7 +26920,7 @@
           <a:p>
             <a:fld id="{FD75B5A3-0CF0-400F-918C-652ACE9597E2}" type="datetimeFigureOut">
               <a:rPr lang="en-US" smtClean="0"/>
-              <a:t>7/1/2019</a:t>
+              <a:t>7/2/19</a:t>
             </a:fld>
             <a:endParaRPr lang="en-US"/>
           </a:p>
@@ -27212,7 +27210,7 @@
           <a:p>
             <a:fld id="{FD75B5A3-0CF0-400F-918C-652ACE9597E2}" type="datetimeFigureOut">
               <a:rPr lang="en-US" smtClean="0"/>
-              <a:t>7/1/2019</a:t>
+              <a:t>7/2/19</a:t>
             </a:fld>
             <a:endParaRPr lang="en-US"/>
           </a:p>
@@ -27484,7 +27482,7 @@
           <a:p>
             <a:fld id="{FD75B5A3-0CF0-400F-918C-652ACE9597E2}" type="datetimeFigureOut">
               <a:rPr lang="en-US" smtClean="0"/>
-              <a:t>7/1/2019</a:t>
+              <a:t>7/2/19</a:t>
             </a:fld>
             <a:endParaRPr lang="en-US"/>
           </a:p>
@@ -27738,7 +27736,7 @@
           <a:p>
             <a:fld id="{FD75B5A3-0CF0-400F-918C-652ACE9597E2}" type="datetimeFigureOut">
               <a:rPr lang="en-US" smtClean="0"/>
-              <a:t>7/1/2019</a:t>
+              <a:t>7/2/19</a:t>
             </a:fld>
             <a:endParaRPr lang="en-US"/>
           </a:p>
@@ -28589,7 +28587,7 @@
             <p:ph idx="1"/>
             <p:extLst>
               <p:ext uri="{D42A27DB-BD31-4B8C-83A1-F6EECF244321}">
-                <p14:modId xmlns:p14="http://schemas.microsoft.com/office/powerpoint/2010/main" val="295611229"/>
+                <p14:modId xmlns:p14="http://schemas.microsoft.com/office/powerpoint/2010/main" val="1405146884"/>
               </p:ext>
             </p:extLst>
           </p:nvPr>
@@ -29297,7 +29295,7 @@
             <p:ph idx="1"/>
             <p:extLst>
               <p:ext uri="{D42A27DB-BD31-4B8C-83A1-F6EECF244321}">
-                <p14:modId xmlns:p14="http://schemas.microsoft.com/office/powerpoint/2010/main" val="4162638207"/>
+                <p14:modId xmlns:p14="http://schemas.microsoft.com/office/powerpoint/2010/main" val="3775036943"/>
               </p:ext>
             </p:extLst>
           </p:nvPr>

</xml_diff>